<commit_message>
Fix typos in Player architecture diagram
</commit_message>
<xml_diff>
--- a/docs/tethergame_player_architecture.pptx
+++ b/docs/tethergame_player_architecture.pptx
@@ -104,6 +104,11 @@
       </a:defRPr>
     </a:lvl9pPr>
   </p:defaultTextStyle>
+  <p:extLst>
+    <p:ext uri="{EFAFB233-063F-42B5-8137-9DF3F51BA10A}">
+      <p15:sldGuideLst xmlns:p15="http://schemas.microsoft.com/office/powerpoint/2012/main"/>
+    </p:ext>
+  </p:extLst>
 </p:presentation>
 </file>
 
@@ -254,7 +259,7 @@
           <a:p>
             <a:fld id="{B0011D97-200D-41DA-A60F-DA581F8730E9}" type="datetimeFigureOut">
               <a:rPr lang="en-US" smtClean="0"/>
-              <a:t>7/22/2025</a:t>
+              <a:t>7/23/2025</a:t>
             </a:fld>
             <a:endParaRPr lang="en-US"/>
           </a:p>
@@ -452,7 +457,7 @@
           <a:p>
             <a:fld id="{B0011D97-200D-41DA-A60F-DA581F8730E9}" type="datetimeFigureOut">
               <a:rPr lang="en-US" smtClean="0"/>
-              <a:t>7/22/2025</a:t>
+              <a:t>7/23/2025</a:t>
             </a:fld>
             <a:endParaRPr lang="en-US"/>
           </a:p>
@@ -660,7 +665,7 @@
           <a:p>
             <a:fld id="{B0011D97-200D-41DA-A60F-DA581F8730E9}" type="datetimeFigureOut">
               <a:rPr lang="en-US" smtClean="0"/>
-              <a:t>7/22/2025</a:t>
+              <a:t>7/23/2025</a:t>
             </a:fld>
             <a:endParaRPr lang="en-US"/>
           </a:p>
@@ -858,7 +863,7 @@
           <a:p>
             <a:fld id="{B0011D97-200D-41DA-A60F-DA581F8730E9}" type="datetimeFigureOut">
               <a:rPr lang="en-US" smtClean="0"/>
-              <a:t>7/22/2025</a:t>
+              <a:t>7/23/2025</a:t>
             </a:fld>
             <a:endParaRPr lang="en-US"/>
           </a:p>
@@ -1133,7 +1138,7 @@
           <a:p>
             <a:fld id="{B0011D97-200D-41DA-A60F-DA581F8730E9}" type="datetimeFigureOut">
               <a:rPr lang="en-US" smtClean="0"/>
-              <a:t>7/22/2025</a:t>
+              <a:t>7/23/2025</a:t>
             </a:fld>
             <a:endParaRPr lang="en-US"/>
           </a:p>
@@ -1398,7 +1403,7 @@
           <a:p>
             <a:fld id="{B0011D97-200D-41DA-A60F-DA581F8730E9}" type="datetimeFigureOut">
               <a:rPr lang="en-US" smtClean="0"/>
-              <a:t>7/22/2025</a:t>
+              <a:t>7/23/2025</a:t>
             </a:fld>
             <a:endParaRPr lang="en-US"/>
           </a:p>
@@ -1810,7 +1815,7 @@
           <a:p>
             <a:fld id="{B0011D97-200D-41DA-A60F-DA581F8730E9}" type="datetimeFigureOut">
               <a:rPr lang="en-US" smtClean="0"/>
-              <a:t>7/22/2025</a:t>
+              <a:t>7/23/2025</a:t>
             </a:fld>
             <a:endParaRPr lang="en-US"/>
           </a:p>
@@ -1951,7 +1956,7 @@
           <a:p>
             <a:fld id="{B0011D97-200D-41DA-A60F-DA581F8730E9}" type="datetimeFigureOut">
               <a:rPr lang="en-US" smtClean="0"/>
-              <a:t>7/22/2025</a:t>
+              <a:t>7/23/2025</a:t>
             </a:fld>
             <a:endParaRPr lang="en-US"/>
           </a:p>
@@ -2064,7 +2069,7 @@
           <a:p>
             <a:fld id="{B0011D97-200D-41DA-A60F-DA581F8730E9}" type="datetimeFigureOut">
               <a:rPr lang="en-US" smtClean="0"/>
-              <a:t>7/22/2025</a:t>
+              <a:t>7/23/2025</a:t>
             </a:fld>
             <a:endParaRPr lang="en-US"/>
           </a:p>
@@ -2375,7 +2380,7 @@
           <a:p>
             <a:fld id="{B0011D97-200D-41DA-A60F-DA581F8730E9}" type="datetimeFigureOut">
               <a:rPr lang="en-US" smtClean="0"/>
-              <a:t>7/22/2025</a:t>
+              <a:t>7/23/2025</a:t>
             </a:fld>
             <a:endParaRPr lang="en-US"/>
           </a:p>
@@ -2663,7 +2668,7 @@
           <a:p>
             <a:fld id="{B0011D97-200D-41DA-A60F-DA581F8730E9}" type="datetimeFigureOut">
               <a:rPr lang="en-US" smtClean="0"/>
-              <a:t>7/22/2025</a:t>
+              <a:t>7/23/2025</a:t>
             </a:fld>
             <a:endParaRPr lang="en-US"/>
           </a:p>
@@ -2904,7 +2909,7 @@
           <a:p>
             <a:fld id="{B0011D97-200D-41DA-A60F-DA581F8730E9}" type="datetimeFigureOut">
               <a:rPr lang="en-US" smtClean="0"/>
-              <a:t>7/22/2025</a:t>
+              <a:t>7/23/2025</a:t>
             </a:fld>
             <a:endParaRPr lang="en-US"/>
           </a:p>
@@ -3545,7 +3550,7 @@
                   <a:schemeClr val="tx1"/>
                 </a:solidFill>
               </a:rPr>
-              <a:t>Input_Controller</a:t>
+              <a:t>Input_Controller_Base</a:t>
             </a:r>
             <a:endParaRPr lang="en-US" sz="1200" dirty="0">
               <a:solidFill>
@@ -3659,7 +3664,23 @@
                   <a:schemeClr val="tx1"/>
                 </a:solidFill>
               </a:rPr>
-              <a:t>Movement_Controller</a:t>
+              <a:t>Movement</a:t>
+            </a:r>
+            <a:r>
+              <a:rPr lang="en-US" sz="1200" err="1">
+                <a:solidFill>
+                  <a:schemeClr val="tx1"/>
+                </a:solidFill>
+              </a:rPr>
+              <a:t>_</a:t>
+            </a:r>
+            <a:r>
+              <a:rPr lang="en-US" sz="1200">
+                <a:solidFill>
+                  <a:schemeClr val="tx1"/>
+                </a:solidFill>
+              </a:rPr>
+              <a:t>Controller_Base</a:t>
             </a:r>
             <a:endParaRPr lang="en-US" sz="1200" i="1" dirty="0">
               <a:solidFill>

</xml_diff>

<commit_message>
Rename player move states for clarity, update Player architecture diagram
</commit_message>
<xml_diff>
--- a/docs/tethergame_player_architecture.pptx
+++ b/docs/tethergame_player_architecture.pptx
@@ -259,7 +259,7 @@
           <a:p>
             <a:fld id="{B0011D97-200D-41DA-A60F-DA581F8730E9}" type="datetimeFigureOut">
               <a:rPr lang="en-US" smtClean="0"/>
-              <a:t>7/23/2025</a:t>
+              <a:t>7/24/2025</a:t>
             </a:fld>
             <a:endParaRPr lang="en-US"/>
           </a:p>
@@ -457,7 +457,7 @@
           <a:p>
             <a:fld id="{B0011D97-200D-41DA-A60F-DA581F8730E9}" type="datetimeFigureOut">
               <a:rPr lang="en-US" smtClean="0"/>
-              <a:t>7/23/2025</a:t>
+              <a:t>7/24/2025</a:t>
             </a:fld>
             <a:endParaRPr lang="en-US"/>
           </a:p>
@@ -665,7 +665,7 @@
           <a:p>
             <a:fld id="{B0011D97-200D-41DA-A60F-DA581F8730E9}" type="datetimeFigureOut">
               <a:rPr lang="en-US" smtClean="0"/>
-              <a:t>7/23/2025</a:t>
+              <a:t>7/24/2025</a:t>
             </a:fld>
             <a:endParaRPr lang="en-US"/>
           </a:p>
@@ -863,7 +863,7 @@
           <a:p>
             <a:fld id="{B0011D97-200D-41DA-A60F-DA581F8730E9}" type="datetimeFigureOut">
               <a:rPr lang="en-US" smtClean="0"/>
-              <a:t>7/23/2025</a:t>
+              <a:t>7/24/2025</a:t>
             </a:fld>
             <a:endParaRPr lang="en-US"/>
           </a:p>
@@ -1138,7 +1138,7 @@
           <a:p>
             <a:fld id="{B0011D97-200D-41DA-A60F-DA581F8730E9}" type="datetimeFigureOut">
               <a:rPr lang="en-US" smtClean="0"/>
-              <a:t>7/23/2025</a:t>
+              <a:t>7/24/2025</a:t>
             </a:fld>
             <a:endParaRPr lang="en-US"/>
           </a:p>
@@ -1403,7 +1403,7 @@
           <a:p>
             <a:fld id="{B0011D97-200D-41DA-A60F-DA581F8730E9}" type="datetimeFigureOut">
               <a:rPr lang="en-US" smtClean="0"/>
-              <a:t>7/23/2025</a:t>
+              <a:t>7/24/2025</a:t>
             </a:fld>
             <a:endParaRPr lang="en-US"/>
           </a:p>
@@ -1815,7 +1815,7 @@
           <a:p>
             <a:fld id="{B0011D97-200D-41DA-A60F-DA581F8730E9}" type="datetimeFigureOut">
               <a:rPr lang="en-US" smtClean="0"/>
-              <a:t>7/23/2025</a:t>
+              <a:t>7/24/2025</a:t>
             </a:fld>
             <a:endParaRPr lang="en-US"/>
           </a:p>
@@ -1956,7 +1956,7 @@
           <a:p>
             <a:fld id="{B0011D97-200D-41DA-A60F-DA581F8730E9}" type="datetimeFigureOut">
               <a:rPr lang="en-US" smtClean="0"/>
-              <a:t>7/23/2025</a:t>
+              <a:t>7/24/2025</a:t>
             </a:fld>
             <a:endParaRPr lang="en-US"/>
           </a:p>
@@ -2069,7 +2069,7 @@
           <a:p>
             <a:fld id="{B0011D97-200D-41DA-A60F-DA581F8730E9}" type="datetimeFigureOut">
               <a:rPr lang="en-US" smtClean="0"/>
-              <a:t>7/23/2025</a:t>
+              <a:t>7/24/2025</a:t>
             </a:fld>
             <a:endParaRPr lang="en-US"/>
           </a:p>
@@ -2380,7 +2380,7 @@
           <a:p>
             <a:fld id="{B0011D97-200D-41DA-A60F-DA581F8730E9}" type="datetimeFigureOut">
               <a:rPr lang="en-US" smtClean="0"/>
-              <a:t>7/23/2025</a:t>
+              <a:t>7/24/2025</a:t>
             </a:fld>
             <a:endParaRPr lang="en-US"/>
           </a:p>
@@ -2668,7 +2668,7 @@
           <a:p>
             <a:fld id="{B0011D97-200D-41DA-A60F-DA581F8730E9}" type="datetimeFigureOut">
               <a:rPr lang="en-US" smtClean="0"/>
-              <a:t>7/23/2025</a:t>
+              <a:t>7/24/2025</a:t>
             </a:fld>
             <a:endParaRPr lang="en-US"/>
           </a:p>
@@ -2909,7 +2909,7 @@
           <a:p>
             <a:fld id="{B0011D97-200D-41DA-A60F-DA581F8730E9}" type="datetimeFigureOut">
               <a:rPr lang="en-US" smtClean="0"/>
-              <a:t>7/23/2025</a:t>
+              <a:t>7/24/2025</a:t>
             </a:fld>
             <a:endParaRPr lang="en-US"/>
           </a:p>
@@ -3340,7 +3340,7 @@
         </p:nvSpPr>
         <p:spPr>
           <a:xfrm>
-            <a:off x="4916625" y="513388"/>
+            <a:off x="4425736" y="774196"/>
             <a:ext cx="4041224" cy="4819264"/>
           </a:xfrm>
           <a:prstGeom prst="rect">
@@ -3413,7 +3413,7 @@
         <p:spPr>
           <a:xfrm>
             <a:off x="366323" y="971683"/>
-            <a:ext cx="4291022" cy="637661"/>
+            <a:ext cx="3464532" cy="637661"/>
           </a:xfrm>
           <a:prstGeom prst="rect">
             <a:avLst/>
@@ -3512,7 +3512,7 @@
         <p:spPr>
           <a:xfrm>
             <a:off x="366322" y="1727763"/>
-            <a:ext cx="4291022" cy="637661"/>
+            <a:ext cx="3464533" cy="637661"/>
           </a:xfrm>
           <a:prstGeom prst="rect">
             <a:avLst/>
@@ -3626,7 +3626,7 @@
         <p:spPr>
           <a:xfrm>
             <a:off x="366322" y="2483843"/>
-            <a:ext cx="4291021" cy="752692"/>
+            <a:ext cx="3464533" cy="994502"/>
           </a:xfrm>
           <a:prstGeom prst="rect">
             <a:avLst/>
@@ -3756,8 +3756,8 @@
         </p:nvSpPr>
         <p:spPr>
           <a:xfrm>
-            <a:off x="5379828" y="2636243"/>
-            <a:ext cx="3087379" cy="2586601"/>
+            <a:off x="4532809" y="2721089"/>
+            <a:ext cx="3087379" cy="2628410"/>
           </a:xfrm>
           <a:prstGeom prst="rect">
             <a:avLst/>
@@ -3795,7 +3795,7 @@
                   <a:schemeClr val="tx1"/>
                 </a:solidFill>
               </a:rPr>
-              <a:t>Movement_Controller_Player</a:t>
+              <a:t>Movement_Controller_State_Machine</a:t>
             </a:r>
             <a:endParaRPr lang="en-US" sz="1200" dirty="0">
               <a:solidFill>
@@ -3861,7 +3861,7 @@
         </p:nvSpPr>
         <p:spPr>
           <a:xfrm>
-            <a:off x="5379828" y="2018639"/>
+            <a:off x="4513557" y="2135820"/>
             <a:ext cx="2459490" cy="360708"/>
           </a:xfrm>
           <a:prstGeom prst="rect">
@@ -3924,7 +3924,7 @@
         </p:nvSpPr>
         <p:spPr>
           <a:xfrm>
-            <a:off x="5379828" y="1525348"/>
+            <a:off x="4513557" y="1596107"/>
             <a:ext cx="2459490" cy="363639"/>
           </a:xfrm>
           <a:prstGeom prst="rect">
@@ -3987,8 +3987,8 @@
         </p:nvSpPr>
         <p:spPr>
           <a:xfrm>
-            <a:off x="5531651" y="3580675"/>
-            <a:ext cx="1987296" cy="1555320"/>
+            <a:off x="4665380" y="3330341"/>
+            <a:ext cx="2799010" cy="1890500"/>
           </a:xfrm>
           <a:prstGeom prst="rect">
             <a:avLst/>
@@ -4030,98 +4030,23 @@
               </a:solidFill>
             </a:endParaRPr>
           </a:p>
-        </p:txBody>
-      </p:sp>
-      <p:sp>
-        <p:nvSpPr>
-          <p:cNvPr id="18" name="Rectangle 17">
-            <a:extLst>
-              <a:ext uri="{FF2B5EF4-FFF2-40B4-BE49-F238E27FC236}">
-                <a16:creationId xmlns:a16="http://schemas.microsoft.com/office/drawing/2014/main" id="{9C99AC97-2056-488D-A6B3-AA7FD061CA82}"/>
-              </a:ext>
-            </a:extLst>
-          </p:cNvPr>
-          <p:cNvSpPr/>
-          <p:nvPr/>
-        </p:nvSpPr>
-        <p:spPr>
-          <a:xfrm>
-            <a:off x="362913" y="4307835"/>
-            <a:ext cx="4291021" cy="1042415"/>
-          </a:xfrm>
-          <a:prstGeom prst="rect">
-            <a:avLst/>
-          </a:prstGeom>
-          <a:noFill/>
-          <a:ln w="28575"/>
-        </p:spPr>
-        <p:style>
-          <a:lnRef idx="2">
-            <a:schemeClr val="accent1">
-              <a:shade val="15000"/>
-            </a:schemeClr>
-          </a:lnRef>
-          <a:fillRef idx="1">
-            <a:schemeClr val="accent1"/>
-          </a:fillRef>
-          <a:effectRef idx="0">
-            <a:schemeClr val="accent1"/>
-          </a:effectRef>
-          <a:fontRef idx="minor">
-            <a:schemeClr val="lt1"/>
-          </a:fontRef>
-        </p:style>
-        <p:txBody>
-          <a:bodyPr rtlCol="0" anchor="t"/>
-          <a:lstStyle/>
-          <a:p>
-            <a:r>
-              <a:rPr lang="en-US" sz="1200" dirty="0" err="1">
+          <a:p>
+            <a:r>
+              <a:rPr lang="en-US" sz="800" i="1" dirty="0">
                 <a:solidFill>
                   <a:schemeClr val="tx1"/>
                 </a:solidFill>
               </a:rPr>
-              <a:t>State_Machine</a:t>
-            </a:r>
-            <a:endParaRPr lang="en-US" sz="1200" i="1" dirty="0">
+              <a:t>transition() -&gt; invoke exit() method of current state, invoke enter() method of new state, update current state</a:t>
+            </a:r>
+          </a:p>
+          <a:p>
+            <a:endParaRPr lang="en-US" sz="800" dirty="0">
               <a:solidFill>
                 <a:schemeClr val="tx1"/>
               </a:solidFill>
             </a:endParaRPr>
           </a:p>
-          <a:p>
-            <a:r>
-              <a:rPr lang="en-US" sz="1000" i="1" dirty="0">
-                <a:solidFill>
-                  <a:schemeClr val="tx1"/>
-                </a:solidFill>
-              </a:rPr>
-              <a:t>_ready() -&gt; scan children for states to populate states </a:t>
-            </a:r>
-            <a:r>
-              <a:rPr lang="en-US" sz="1000" i="1" dirty="0" err="1">
-                <a:solidFill>
-                  <a:schemeClr val="tx1"/>
-                </a:solidFill>
-              </a:rPr>
-              <a:t>dict</a:t>
-            </a:r>
-            <a:endParaRPr lang="en-US" sz="1000" i="1" dirty="0">
-              <a:solidFill>
-                <a:schemeClr val="tx1"/>
-              </a:solidFill>
-            </a:endParaRPr>
-          </a:p>
-          <a:p>
-            <a:r>
-              <a:rPr lang="en-US" sz="1000" i="1" dirty="0">
-                <a:solidFill>
-                  <a:schemeClr val="tx1"/>
-                </a:solidFill>
-              </a:rPr>
-              <a:t>transition() -&gt; invoke exit() method of current state, enter() method of new state, updates current state</a:t>
-            </a:r>
-          </a:p>
         </p:txBody>
       </p:sp>
       <p:sp>
@@ -4138,7 +4063,7 @@
         </p:nvSpPr>
         <p:spPr>
           <a:xfrm>
-            <a:off x="658932" y="5626389"/>
+            <a:off x="972126" y="3747422"/>
             <a:ext cx="1811818" cy="1137799"/>
           </a:xfrm>
           <a:prstGeom prst="rect">
@@ -4253,8 +4178,8 @@
         </p:nvSpPr>
         <p:spPr>
           <a:xfrm>
-            <a:off x="5635283" y="3951272"/>
-            <a:ext cx="1620973" cy="308697"/>
+            <a:off x="4769012" y="4036118"/>
+            <a:ext cx="2628001" cy="308697"/>
           </a:xfrm>
           <a:prstGeom prst="rect">
             <a:avLst/>
@@ -4312,7 +4237,7 @@
         </p:nvSpPr>
         <p:spPr>
           <a:xfrm>
-            <a:off x="2799970" y="5593460"/>
+            <a:off x="905426" y="5037551"/>
             <a:ext cx="1945896" cy="623897"/>
           </a:xfrm>
           <a:prstGeom prst="rect">
@@ -4397,8 +4322,8 @@
         </p:nvSpPr>
         <p:spPr>
           <a:xfrm>
-            <a:off x="5635283" y="4344005"/>
-            <a:ext cx="1620973" cy="288792"/>
+            <a:off x="4769012" y="4428851"/>
+            <a:ext cx="2628001" cy="288792"/>
           </a:xfrm>
           <a:prstGeom prst="rect">
             <a:avLst/>
@@ -4456,8 +4381,8 @@
         </p:nvSpPr>
         <p:spPr>
           <a:xfrm>
-            <a:off x="5635283" y="4716833"/>
-            <a:ext cx="1620973" cy="288792"/>
+            <a:off x="4769012" y="4801679"/>
+            <a:ext cx="2628001" cy="288792"/>
           </a:xfrm>
           <a:prstGeom prst="rect">
             <a:avLst/>
@@ -4512,20 +4437,25 @@
           </p:cNvPr>
           <p:cNvCxnSpPr>
             <a:cxnSpLocks/>
-            <a:stCxn id="21" idx="1"/>
-            <a:endCxn id="19" idx="3"/>
+            <a:stCxn id="21" idx="0"/>
+            <a:endCxn id="19" idx="2"/>
           </p:cNvCxnSpPr>
           <p:nvPr/>
         </p:nvCxnSpPr>
         <p:spPr>
-          <a:xfrm rot="10800000" flipV="1">
-            <a:off x="2470750" y="5905409"/>
-            <a:ext cx="329220" cy="289880"/>
+          <a:xfrm rot="16200000" flipV="1">
+            <a:off x="1802040" y="4961216"/>
+            <a:ext cx="152330" cy="339"/>
           </a:xfrm>
           <a:prstGeom prst="bentConnector3">
-            <a:avLst/>
+            <a:avLst>
+              <a:gd name="adj1" fmla="val 50000"/>
+            </a:avLst>
           </a:prstGeom>
           <a:ln>
+            <a:solidFill>
+              <a:schemeClr val="accent6"/>
+            </a:solidFill>
             <a:tailEnd type="triangle"/>
           </a:ln>
         </p:spPr>
@@ -4558,8 +4488,8 @@
         </p:nvSpPr>
         <p:spPr>
           <a:xfrm>
-            <a:off x="305363" y="80272"/>
-            <a:ext cx="4102185" cy="752692"/>
+            <a:off x="305364" y="80272"/>
+            <a:ext cx="3525492" cy="454161"/>
           </a:xfrm>
           <a:prstGeom prst="rect">
             <a:avLst/>
@@ -4649,19 +4579,6 @@
               <a:t>() -&gt; for reflection</a:t>
             </a:r>
           </a:p>
-          <a:p>
-            <a:r>
-              <a:rPr lang="en-US" sz="1000" i="1" dirty="0">
-                <a:solidFill>
-                  <a:schemeClr val="tx1">
-                    <a:lumMod val="50000"/>
-                    <a:lumOff val="50000"/>
-                  </a:schemeClr>
-                </a:solidFill>
-              </a:rPr>
-              <a:t>virtual static construct() -&gt; to allow complex controllers (e.g. scenes) to be constructed dynamically</a:t>
-            </a:r>
-          </a:p>
         </p:txBody>
       </p:sp>
       <p:cxnSp>
@@ -4682,15 +4599,18 @@
         </p:nvCxnSpPr>
         <p:spPr>
           <a:xfrm rot="10800000">
-            <a:off x="305363" y="456618"/>
-            <a:ext cx="60960" cy="833896"/>
+            <a:off x="305365" y="307354"/>
+            <a:ext cx="60959" cy="983161"/>
           </a:xfrm>
           <a:prstGeom prst="bentConnector3">
             <a:avLst>
-              <a:gd name="adj1" fmla="val 475000"/>
+              <a:gd name="adj1" fmla="val 475006"/>
             </a:avLst>
           </a:prstGeom>
           <a:ln>
+            <a:solidFill>
+              <a:schemeClr val="accent6"/>
+            </a:solidFill>
             <a:tailEnd type="triangle"/>
           </a:ln>
         </p:spPr>
@@ -4727,15 +4647,18 @@
         </p:nvCxnSpPr>
         <p:spPr>
           <a:xfrm rot="10800000">
-            <a:off x="305364" y="456619"/>
-            <a:ext cx="60959" cy="2403571"/>
+            <a:off x="305364" y="307354"/>
+            <a:ext cx="60958" cy="2673741"/>
           </a:xfrm>
           <a:prstGeom prst="bentConnector3">
             <a:avLst>
-              <a:gd name="adj1" fmla="val 475006"/>
+              <a:gd name="adj1" fmla="val 475012"/>
             </a:avLst>
           </a:prstGeom>
           <a:ln>
+            <a:solidFill>
+              <a:schemeClr val="accent6"/>
+            </a:solidFill>
             <a:tailEnd type="triangle"/>
           </a:ln>
         </p:spPr>
@@ -4772,15 +4695,18 @@
         </p:nvCxnSpPr>
         <p:spPr>
           <a:xfrm rot="10800000">
-            <a:off x="305364" y="456618"/>
-            <a:ext cx="60959" cy="1589976"/>
+            <a:off x="305364" y="307354"/>
+            <a:ext cx="60958" cy="1739241"/>
           </a:xfrm>
           <a:prstGeom prst="bentConnector3">
             <a:avLst>
-              <a:gd name="adj1" fmla="val 475006"/>
+              <a:gd name="adj1" fmla="val 475012"/>
             </a:avLst>
           </a:prstGeom>
           <a:ln>
+            <a:solidFill>
+              <a:schemeClr val="accent6"/>
+            </a:solidFill>
             <a:tailEnd type="triangle"/>
           </a:ln>
         </p:spPr>
@@ -4809,6 +4735,7 @@
             </a:extLst>
           </p:cNvPr>
           <p:cNvCxnSpPr>
+            <a:cxnSpLocks/>
             <a:stCxn id="12" idx="1"/>
             <a:endCxn id="6" idx="3"/>
           </p:cNvCxnSpPr>
@@ -4816,13 +4743,16 @@
         </p:nvCxnSpPr>
         <p:spPr>
           <a:xfrm rot="10800000">
-            <a:off x="4657346" y="1290514"/>
-            <a:ext cx="722483" cy="416654"/>
+            <a:off x="3830855" y="1290515"/>
+            <a:ext cx="682702" cy="487413"/>
           </a:xfrm>
           <a:prstGeom prst="bentConnector3">
             <a:avLst/>
           </a:prstGeom>
           <a:ln>
+            <a:solidFill>
+              <a:schemeClr val="accent6"/>
+            </a:solidFill>
             <a:tailEnd type="triangle"/>
           </a:ln>
         </p:spPr>
@@ -4859,8 +4789,8 @@
         </p:nvCxnSpPr>
         <p:spPr>
           <a:xfrm rot="10800000">
-            <a:off x="4657344" y="2046595"/>
-            <a:ext cx="722484" cy="152399"/>
+            <a:off x="3830855" y="2046594"/>
+            <a:ext cx="682702" cy="269580"/>
           </a:xfrm>
           <a:prstGeom prst="bentConnector3">
             <a:avLst>
@@ -4868,6 +4798,9 @@
             </a:avLst>
           </a:prstGeom>
           <a:ln>
+            <a:solidFill>
+              <a:schemeClr val="accent6"/>
+            </a:solidFill>
             <a:tailEnd type="triangle"/>
           </a:ln>
         </p:spPr>
@@ -4888,10 +4821,154 @@
       </p:cxnSp>
       <p:cxnSp>
         <p:nvCxnSpPr>
-          <p:cNvPr id="76" name="Connector: Elbow 75">
-            <a:extLst>
-              <a:ext uri="{FF2B5EF4-FFF2-40B4-BE49-F238E27FC236}">
-                <a16:creationId xmlns:a16="http://schemas.microsoft.com/office/drawing/2014/main" id="{8C5CCE5F-EAB1-7105-2934-37815A847B10}"/>
+          <p:cNvPr id="84" name="Connector: Elbow 83">
+            <a:extLst>
+              <a:ext uri="{FF2B5EF4-FFF2-40B4-BE49-F238E27FC236}">
+                <a16:creationId xmlns:a16="http://schemas.microsoft.com/office/drawing/2014/main" id="{8124F973-CB29-69BA-7B69-F0A3D20F50C4}"/>
+              </a:ext>
+            </a:extLst>
+          </p:cNvPr>
+          <p:cNvCxnSpPr>
+            <a:cxnSpLocks/>
+            <a:stCxn id="20" idx="1"/>
+            <a:endCxn id="21" idx="3"/>
+          </p:cNvCxnSpPr>
+          <p:nvPr/>
+        </p:nvCxnSpPr>
+        <p:spPr>
+          <a:xfrm rot="10800000" flipV="1">
+            <a:off x="2851322" y="4190466"/>
+            <a:ext cx="1917690" cy="1159033"/>
+          </a:xfrm>
+          <a:prstGeom prst="bentConnector3">
+            <a:avLst>
+              <a:gd name="adj1" fmla="val 50000"/>
+            </a:avLst>
+          </a:prstGeom>
+          <a:ln>
+            <a:solidFill>
+              <a:schemeClr val="accent6"/>
+            </a:solidFill>
+            <a:tailEnd type="triangle"/>
+          </a:ln>
+        </p:spPr>
+        <p:style>
+          <a:lnRef idx="2">
+            <a:schemeClr val="accent1"/>
+          </a:lnRef>
+          <a:fillRef idx="0">
+            <a:schemeClr val="accent1"/>
+          </a:fillRef>
+          <a:effectRef idx="1">
+            <a:schemeClr val="accent1"/>
+          </a:effectRef>
+          <a:fontRef idx="minor">
+            <a:schemeClr val="tx1"/>
+          </a:fontRef>
+        </p:style>
+      </p:cxnSp>
+      <p:cxnSp>
+        <p:nvCxnSpPr>
+          <p:cNvPr id="95" name="Connector: Elbow 94">
+            <a:extLst>
+              <a:ext uri="{FF2B5EF4-FFF2-40B4-BE49-F238E27FC236}">
+                <a16:creationId xmlns:a16="http://schemas.microsoft.com/office/drawing/2014/main" id="{C2F38228-51E4-12A5-5905-61D12D479793}"/>
+              </a:ext>
+            </a:extLst>
+          </p:cNvPr>
+          <p:cNvCxnSpPr>
+            <a:cxnSpLocks/>
+            <a:stCxn id="22" idx="1"/>
+            <a:endCxn id="21" idx="3"/>
+          </p:cNvCxnSpPr>
+          <p:nvPr/>
+        </p:nvCxnSpPr>
+        <p:spPr>
+          <a:xfrm rot="10800000" flipV="1">
+            <a:off x="2851322" y="4573246"/>
+            <a:ext cx="1917690" cy="776253"/>
+          </a:xfrm>
+          <a:prstGeom prst="bentConnector3">
+            <a:avLst>
+              <a:gd name="adj1" fmla="val 50000"/>
+            </a:avLst>
+          </a:prstGeom>
+          <a:ln>
+            <a:solidFill>
+              <a:schemeClr val="accent6"/>
+            </a:solidFill>
+            <a:tailEnd type="triangle"/>
+          </a:ln>
+        </p:spPr>
+        <p:style>
+          <a:lnRef idx="2">
+            <a:schemeClr val="accent1"/>
+          </a:lnRef>
+          <a:fillRef idx="0">
+            <a:schemeClr val="accent1"/>
+          </a:fillRef>
+          <a:effectRef idx="1">
+            <a:schemeClr val="accent1"/>
+          </a:effectRef>
+          <a:fontRef idx="minor">
+            <a:schemeClr val="tx1"/>
+          </a:fontRef>
+        </p:style>
+      </p:cxnSp>
+      <p:cxnSp>
+        <p:nvCxnSpPr>
+          <p:cNvPr id="98" name="Connector: Elbow 97">
+            <a:extLst>
+              <a:ext uri="{FF2B5EF4-FFF2-40B4-BE49-F238E27FC236}">
+                <a16:creationId xmlns:a16="http://schemas.microsoft.com/office/drawing/2014/main" id="{8CE18FF5-F2C6-EBB6-FB85-F3561C873AB3}"/>
+              </a:ext>
+            </a:extLst>
+          </p:cNvPr>
+          <p:cNvCxnSpPr>
+            <a:cxnSpLocks/>
+            <a:stCxn id="23" idx="1"/>
+            <a:endCxn id="21" idx="3"/>
+          </p:cNvCxnSpPr>
+          <p:nvPr/>
+        </p:nvCxnSpPr>
+        <p:spPr>
+          <a:xfrm rot="10800000" flipV="1">
+            <a:off x="2851322" y="4946074"/>
+            <a:ext cx="1917690" cy="403425"/>
+          </a:xfrm>
+          <a:prstGeom prst="bentConnector3">
+            <a:avLst>
+              <a:gd name="adj1" fmla="val 50000"/>
+            </a:avLst>
+          </a:prstGeom>
+          <a:ln>
+            <a:solidFill>
+              <a:schemeClr val="accent6"/>
+            </a:solidFill>
+            <a:tailEnd type="triangle"/>
+          </a:ln>
+        </p:spPr>
+        <p:style>
+          <a:lnRef idx="2">
+            <a:schemeClr val="accent1"/>
+          </a:lnRef>
+          <a:fillRef idx="0">
+            <a:schemeClr val="accent1"/>
+          </a:fillRef>
+          <a:effectRef idx="1">
+            <a:schemeClr val="accent1"/>
+          </a:effectRef>
+          <a:fontRef idx="minor">
+            <a:schemeClr val="tx1"/>
+          </a:fontRef>
+        </p:style>
+      </p:cxnSp>
+      <p:cxnSp>
+        <p:nvCxnSpPr>
+          <p:cNvPr id="38" name="Connector: Elbow 37">
+            <a:extLst>
+              <a:ext uri="{FF2B5EF4-FFF2-40B4-BE49-F238E27FC236}">
+                <a16:creationId xmlns:a16="http://schemas.microsoft.com/office/drawing/2014/main" id="{F50ECAA0-1209-9ED1-9887-9FAFB9D65DB1}"/>
               </a:ext>
             </a:extLst>
           </p:cNvPr>
@@ -4904,8 +4981,8 @@
         </p:nvCxnSpPr>
         <p:spPr>
           <a:xfrm rot="10800000">
-            <a:off x="4657344" y="2860190"/>
-            <a:ext cx="722485" cy="1069355"/>
+            <a:off x="3830855" y="2981094"/>
+            <a:ext cx="701954" cy="1054200"/>
           </a:xfrm>
           <a:prstGeom prst="bentConnector3">
             <a:avLst>
@@ -4913,6 +4990,9 @@
             </a:avLst>
           </a:prstGeom>
           <a:ln>
+            <a:solidFill>
+              <a:schemeClr val="accent6"/>
+            </a:solidFill>
             <a:tailEnd type="triangle"/>
           </a:ln>
         </p:spPr>
@@ -4931,147 +5011,12 @@
           </a:fontRef>
         </p:style>
       </p:cxnSp>
-      <p:cxnSp>
-        <p:nvCxnSpPr>
-          <p:cNvPr id="84" name="Connector: Elbow 83">
-            <a:extLst>
-              <a:ext uri="{FF2B5EF4-FFF2-40B4-BE49-F238E27FC236}">
-                <a16:creationId xmlns:a16="http://schemas.microsoft.com/office/drawing/2014/main" id="{8124F973-CB29-69BA-7B69-F0A3D20F50C4}"/>
-              </a:ext>
-            </a:extLst>
-          </p:cNvPr>
-          <p:cNvCxnSpPr>
-            <a:cxnSpLocks/>
-            <a:stCxn id="20" idx="1"/>
-            <a:endCxn id="21" idx="3"/>
-          </p:cNvCxnSpPr>
-          <p:nvPr/>
-        </p:nvCxnSpPr>
-        <p:spPr>
-          <a:xfrm rot="10800000" flipV="1">
-            <a:off x="4745867" y="4105621"/>
-            <a:ext cx="889417" cy="1799788"/>
-          </a:xfrm>
-          <a:prstGeom prst="bentConnector3">
-            <a:avLst>
-              <a:gd name="adj1" fmla="val 50000"/>
-            </a:avLst>
-          </a:prstGeom>
-          <a:ln>
-            <a:tailEnd type="triangle"/>
-          </a:ln>
-        </p:spPr>
-        <p:style>
-          <a:lnRef idx="2">
-            <a:schemeClr val="accent1"/>
-          </a:lnRef>
-          <a:fillRef idx="0">
-            <a:schemeClr val="accent1"/>
-          </a:fillRef>
-          <a:effectRef idx="1">
-            <a:schemeClr val="accent1"/>
-          </a:effectRef>
-          <a:fontRef idx="minor">
-            <a:schemeClr val="tx1"/>
-          </a:fontRef>
-        </p:style>
-      </p:cxnSp>
-      <p:cxnSp>
-        <p:nvCxnSpPr>
-          <p:cNvPr id="95" name="Connector: Elbow 94">
-            <a:extLst>
-              <a:ext uri="{FF2B5EF4-FFF2-40B4-BE49-F238E27FC236}">
-                <a16:creationId xmlns:a16="http://schemas.microsoft.com/office/drawing/2014/main" id="{C2F38228-51E4-12A5-5905-61D12D479793}"/>
-              </a:ext>
-            </a:extLst>
-          </p:cNvPr>
-          <p:cNvCxnSpPr>
-            <a:cxnSpLocks/>
-            <a:stCxn id="22" idx="1"/>
-            <a:endCxn id="21" idx="3"/>
-          </p:cNvCxnSpPr>
-          <p:nvPr/>
-        </p:nvCxnSpPr>
-        <p:spPr>
-          <a:xfrm rot="10800000" flipV="1">
-            <a:off x="4745867" y="4488401"/>
-            <a:ext cx="889417" cy="1417008"/>
-          </a:xfrm>
-          <a:prstGeom prst="bentConnector3">
-            <a:avLst>
-              <a:gd name="adj1" fmla="val 50000"/>
-            </a:avLst>
-          </a:prstGeom>
-          <a:ln>
-            <a:tailEnd type="triangle"/>
-          </a:ln>
-        </p:spPr>
-        <p:style>
-          <a:lnRef idx="2">
-            <a:schemeClr val="accent1"/>
-          </a:lnRef>
-          <a:fillRef idx="0">
-            <a:schemeClr val="accent1"/>
-          </a:fillRef>
-          <a:effectRef idx="1">
-            <a:schemeClr val="accent1"/>
-          </a:effectRef>
-          <a:fontRef idx="minor">
-            <a:schemeClr val="tx1"/>
-          </a:fontRef>
-        </p:style>
-      </p:cxnSp>
-      <p:cxnSp>
-        <p:nvCxnSpPr>
-          <p:cNvPr id="98" name="Connector: Elbow 97">
-            <a:extLst>
-              <a:ext uri="{FF2B5EF4-FFF2-40B4-BE49-F238E27FC236}">
-                <a16:creationId xmlns:a16="http://schemas.microsoft.com/office/drawing/2014/main" id="{8CE18FF5-F2C6-EBB6-FB85-F3561C873AB3}"/>
-              </a:ext>
-            </a:extLst>
-          </p:cNvPr>
-          <p:cNvCxnSpPr>
-            <a:cxnSpLocks/>
-            <a:stCxn id="23" idx="1"/>
-            <a:endCxn id="21" idx="3"/>
-          </p:cNvCxnSpPr>
-          <p:nvPr/>
-        </p:nvCxnSpPr>
-        <p:spPr>
-          <a:xfrm rot="10800000" flipV="1">
-            <a:off x="4745867" y="4861229"/>
-            <a:ext cx="889417" cy="1044180"/>
-          </a:xfrm>
-          <a:prstGeom prst="bentConnector3">
-            <a:avLst>
-              <a:gd name="adj1" fmla="val 50000"/>
-            </a:avLst>
-          </a:prstGeom>
-          <a:ln>
-            <a:tailEnd type="triangle"/>
-          </a:ln>
-        </p:spPr>
-        <p:style>
-          <a:lnRef idx="2">
-            <a:schemeClr val="accent1"/>
-          </a:lnRef>
-          <a:fillRef idx="0">
-            <a:schemeClr val="accent1"/>
-          </a:fillRef>
-          <a:effectRef idx="1">
-            <a:schemeClr val="accent1"/>
-          </a:effectRef>
-          <a:fontRef idx="minor">
-            <a:schemeClr val="tx1"/>
-          </a:fontRef>
-        </p:style>
-      </p:cxnSp>
-      <p:sp>
-        <p:nvSpPr>
-          <p:cNvPr id="106" name="Rectangle 105">
-            <a:extLst>
-              <a:ext uri="{FF2B5EF4-FFF2-40B4-BE49-F238E27FC236}">
-                <a16:creationId xmlns:a16="http://schemas.microsoft.com/office/drawing/2014/main" id="{FC133E16-5498-C7CC-535C-3BEA289327CA}"/>
+      <p:sp>
+        <p:nvSpPr>
+          <p:cNvPr id="116" name="Rectangle 115">
+            <a:extLst>
+              <a:ext uri="{FF2B5EF4-FFF2-40B4-BE49-F238E27FC236}">
+                <a16:creationId xmlns:a16="http://schemas.microsoft.com/office/drawing/2014/main" id="{58A768F1-1DB2-03A8-6E72-6DEC6FD9A48F}"/>
               </a:ext>
             </a:extLst>
           </p:cNvPr>
@@ -5080,8 +5025,8 @@
         </p:nvSpPr>
         <p:spPr>
           <a:xfrm>
-            <a:off x="9265896" y="2636243"/>
-            <a:ext cx="2645621" cy="2696409"/>
+            <a:off x="9026204" y="775687"/>
+            <a:ext cx="3087379" cy="1890511"/>
           </a:xfrm>
           <a:prstGeom prst="rect">
             <a:avLst/>
@@ -5119,7 +5064,7 @@
                   <a:schemeClr val="tx1"/>
                 </a:solidFill>
               </a:rPr>
-              <a:t>Movement_Controller_Player_Alt</a:t>
+              <a:t>Movement_Controller_State_Machine</a:t>
             </a:r>
             <a:endParaRPr lang="en-US" sz="1200" dirty="0">
               <a:solidFill>
@@ -5127,56 +5072,14 @@
               </a:solidFill>
             </a:endParaRPr>
           </a:p>
-          <a:p>
-            <a:r>
-              <a:rPr lang="en-US" sz="1000" i="1" dirty="0">
-                <a:solidFill>
-                  <a:schemeClr val="tx1"/>
-                </a:solidFill>
-              </a:rPr>
-              <a:t>move() -&gt; invoke </a:t>
-            </a:r>
-            <a:r>
-              <a:rPr lang="en-US" sz="1000" i="1" dirty="0" err="1">
-                <a:solidFill>
-                  <a:schemeClr val="tx1"/>
-                </a:solidFill>
-              </a:rPr>
-              <a:t>update_velocity</a:t>
-            </a:r>
-            <a:r>
-              <a:rPr lang="en-US" sz="1000" i="1" dirty="0">
-                <a:solidFill>
-                  <a:schemeClr val="tx1"/>
-                </a:solidFill>
-              </a:rPr>
-              <a:t>() method of current movement state and apply </a:t>
-            </a:r>
-            <a:r>
-              <a:rPr lang="en-US" sz="1000" i="1" dirty="0" err="1">
-                <a:solidFill>
-                  <a:schemeClr val="tx1"/>
-                </a:solidFill>
-              </a:rPr>
-              <a:t>move_and_slide</a:t>
-            </a:r>
-            <a:r>
-              <a:rPr lang="en-US" sz="1000" i="1" dirty="0">
-                <a:solidFill>
-                  <a:schemeClr val="tx1"/>
-                </a:solidFill>
-              </a:rPr>
-              <a:t>()</a:t>
-            </a:r>
-          </a:p>
-        </p:txBody>
-      </p:sp>
-      <p:sp>
-        <p:nvSpPr>
-          <p:cNvPr id="107" name="Rectangle 106">
-            <a:extLst>
-              <a:ext uri="{FF2B5EF4-FFF2-40B4-BE49-F238E27FC236}">
-                <a16:creationId xmlns:a16="http://schemas.microsoft.com/office/drawing/2014/main" id="{3707E309-1088-EC25-847F-4B63FA4BD3B8}"/>
+        </p:txBody>
+      </p:sp>
+      <p:sp>
+        <p:nvSpPr>
+          <p:cNvPr id="117" name="Rectangle 116">
+            <a:extLst>
+              <a:ext uri="{FF2B5EF4-FFF2-40B4-BE49-F238E27FC236}">
+                <a16:creationId xmlns:a16="http://schemas.microsoft.com/office/drawing/2014/main" id="{B774CCFF-DDAB-CE23-3776-9AA77D00C882}"/>
               </a:ext>
             </a:extLst>
           </p:cNvPr>
@@ -5185,8 +5088,8 @@
         </p:nvSpPr>
         <p:spPr>
           <a:xfrm>
-            <a:off x="9616591" y="3580675"/>
-            <a:ext cx="1987296" cy="1584983"/>
+            <a:off x="9153962" y="1052997"/>
+            <a:ext cx="2799010" cy="1492885"/>
           </a:xfrm>
           <a:prstGeom prst="rect">
             <a:avLst/>
@@ -5232,10 +5135,10 @@
       </p:sp>
       <p:sp>
         <p:nvSpPr>
-          <p:cNvPr id="108" name="Rectangle 107">
-            <a:extLst>
-              <a:ext uri="{FF2B5EF4-FFF2-40B4-BE49-F238E27FC236}">
-                <a16:creationId xmlns:a16="http://schemas.microsoft.com/office/drawing/2014/main" id="{905B9890-8596-0F12-101A-9C049782EC9E}"/>
+          <p:cNvPr id="118" name="Rectangle 117">
+            <a:extLst>
+              <a:ext uri="{FF2B5EF4-FFF2-40B4-BE49-F238E27FC236}">
+                <a16:creationId xmlns:a16="http://schemas.microsoft.com/office/drawing/2014/main" id="{18930014-994C-F7A7-D878-4D832425F802}"/>
               </a:ext>
             </a:extLst>
           </p:cNvPr>
@@ -5244,8 +5147,8 @@
         </p:nvSpPr>
         <p:spPr>
           <a:xfrm>
-            <a:off x="9720223" y="3980935"/>
-            <a:ext cx="1620973" cy="308697"/>
+            <a:off x="9258636" y="1359326"/>
+            <a:ext cx="2628001" cy="308697"/>
           </a:xfrm>
           <a:prstGeom prst="rect">
             <a:avLst/>
@@ -5279,7 +5182,7 @@
                   <a:schemeClr val="tx1"/>
                 </a:solidFill>
               </a:rPr>
-              <a:t>Player_Alt_Walk_State</a:t>
+              <a:t>Tethered_Walk_State</a:t>
             </a:r>
             <a:endParaRPr lang="en-US" sz="1050" dirty="0">
               <a:solidFill>
@@ -5291,10 +5194,10 @@
       </p:sp>
       <p:sp>
         <p:nvSpPr>
-          <p:cNvPr id="109" name="Rectangle 108">
-            <a:extLst>
-              <a:ext uri="{FF2B5EF4-FFF2-40B4-BE49-F238E27FC236}">
-                <a16:creationId xmlns:a16="http://schemas.microsoft.com/office/drawing/2014/main" id="{8E81673C-B72B-6D17-7038-CBB4C98C0BC8}"/>
+          <p:cNvPr id="119" name="Rectangle 118">
+            <a:extLst>
+              <a:ext uri="{FF2B5EF4-FFF2-40B4-BE49-F238E27FC236}">
+                <a16:creationId xmlns:a16="http://schemas.microsoft.com/office/drawing/2014/main" id="{422C43BC-88F8-16B5-B9ED-A838CDDB5553}"/>
               </a:ext>
             </a:extLst>
           </p:cNvPr>
@@ -5303,8 +5206,8 @@
         </p:nvSpPr>
         <p:spPr>
           <a:xfrm>
-            <a:off x="9720223" y="4373668"/>
-            <a:ext cx="1620973" cy="288792"/>
+            <a:off x="9258636" y="1752059"/>
+            <a:ext cx="2628001" cy="288792"/>
           </a:xfrm>
           <a:prstGeom prst="rect">
             <a:avLst/>
@@ -5338,7 +5241,7 @@
                   <a:schemeClr val="tx1"/>
                 </a:solidFill>
               </a:rPr>
-              <a:t>Player_Alt_Idle_State</a:t>
+              <a:t>Tethered_Idle_State</a:t>
             </a:r>
             <a:endParaRPr lang="en-US" sz="1050" dirty="0">
               <a:solidFill>
@@ -5350,10 +5253,10 @@
       </p:sp>
       <p:sp>
         <p:nvSpPr>
-          <p:cNvPr id="110" name="Rectangle 109">
-            <a:extLst>
-              <a:ext uri="{FF2B5EF4-FFF2-40B4-BE49-F238E27FC236}">
-                <a16:creationId xmlns:a16="http://schemas.microsoft.com/office/drawing/2014/main" id="{E77311FC-813D-164B-7E90-041BEBEE7B52}"/>
+          <p:cNvPr id="120" name="Rectangle 119">
+            <a:extLst>
+              <a:ext uri="{FF2B5EF4-FFF2-40B4-BE49-F238E27FC236}">
+                <a16:creationId xmlns:a16="http://schemas.microsoft.com/office/drawing/2014/main" id="{AEFACE29-B27E-641D-0A2D-9D41458B02A5}"/>
               </a:ext>
             </a:extLst>
           </p:cNvPr>
@@ -5362,8 +5265,8 @@
         </p:nvSpPr>
         <p:spPr>
           <a:xfrm>
-            <a:off x="9720223" y="4746496"/>
-            <a:ext cx="1620973" cy="288792"/>
+            <a:off x="9258636" y="2124887"/>
+            <a:ext cx="2628001" cy="288792"/>
           </a:xfrm>
           <a:prstGeom prst="rect">
             <a:avLst/>
@@ -5397,7 +5300,7 @@
                   <a:schemeClr val="tx1"/>
                 </a:solidFill>
               </a:rPr>
-              <a:t>Player_Alt_Fly_State</a:t>
+              <a:t>Tethered_Air_State</a:t>
             </a:r>
             <a:endParaRPr lang="en-US" sz="1050" dirty="0">
               <a:solidFill>
@@ -5409,10 +5312,10 @@
       </p:sp>
       <p:sp>
         <p:nvSpPr>
-          <p:cNvPr id="126" name="Arrow: Left-Right 125">
-            <a:extLst>
-              <a:ext uri="{FF2B5EF4-FFF2-40B4-BE49-F238E27FC236}">
-                <a16:creationId xmlns:a16="http://schemas.microsoft.com/office/drawing/2014/main" id="{DA13B260-7DD5-AED3-607C-820F6E049351}"/>
+          <p:cNvPr id="121" name="Rectangle 120">
+            <a:extLst>
+              <a:ext uri="{FF2B5EF4-FFF2-40B4-BE49-F238E27FC236}">
+                <a16:creationId xmlns:a16="http://schemas.microsoft.com/office/drawing/2014/main" id="{CA241C0E-9432-D7FD-BA58-44B9A4935DB6}"/>
               </a:ext>
             </a:extLst>
           </p:cNvPr>
@@ -5421,12 +5324,18 @@
         </p:nvSpPr>
         <p:spPr>
           <a:xfrm>
-            <a:off x="8467207" y="4014714"/>
-            <a:ext cx="798689" cy="238384"/>
+            <a:off x="9026204" y="3399559"/>
+            <a:ext cx="3087379" cy="1890511"/>
           </a:xfrm>
-          <a:prstGeom prst="leftRightArrow">
+          <a:prstGeom prst="rect">
             <a:avLst/>
           </a:prstGeom>
+          <a:noFill/>
+          <a:ln w="28575">
+            <a:solidFill>
+              <a:schemeClr val="tx1"/>
+            </a:solidFill>
+          </a:ln>
         </p:spPr>
         <p:style>
           <a:lnRef idx="2">
@@ -5445,11 +5354,328 @@
           </a:fontRef>
         </p:style>
         <p:txBody>
-          <a:bodyPr rtlCol="0" anchor="ctr"/>
-          <a:lstStyle/>
-          <a:p>
-            <a:pPr algn="ctr"/>
-            <a:endParaRPr lang="en-US"/>
+          <a:bodyPr rtlCol="0" anchor="t"/>
+          <a:lstStyle/>
+          <a:p>
+            <a:r>
+              <a:rPr lang="en-US" sz="1200" dirty="0" err="1">
+                <a:solidFill>
+                  <a:schemeClr val="tx1"/>
+                </a:solidFill>
+              </a:rPr>
+              <a:t>Movement_Controller_State_Machine</a:t>
+            </a:r>
+            <a:endParaRPr lang="en-US" sz="1200" dirty="0">
+              <a:solidFill>
+                <a:schemeClr val="tx1"/>
+              </a:solidFill>
+            </a:endParaRPr>
+          </a:p>
+        </p:txBody>
+      </p:sp>
+      <p:sp>
+        <p:nvSpPr>
+          <p:cNvPr id="122" name="Rectangle 121">
+            <a:extLst>
+              <a:ext uri="{FF2B5EF4-FFF2-40B4-BE49-F238E27FC236}">
+                <a16:creationId xmlns:a16="http://schemas.microsoft.com/office/drawing/2014/main" id="{2E3E50BD-023B-60DE-B410-6D6B12249657}"/>
+              </a:ext>
+            </a:extLst>
+          </p:cNvPr>
+          <p:cNvSpPr/>
+          <p:nvPr/>
+        </p:nvSpPr>
+        <p:spPr>
+          <a:xfrm>
+            <a:off x="9153962" y="3676869"/>
+            <a:ext cx="2799010" cy="1492885"/>
+          </a:xfrm>
+          <a:prstGeom prst="rect">
+            <a:avLst/>
+          </a:prstGeom>
+          <a:noFill/>
+          <a:ln w="28575"/>
+        </p:spPr>
+        <p:style>
+          <a:lnRef idx="2">
+            <a:schemeClr val="accent1">
+              <a:shade val="15000"/>
+            </a:schemeClr>
+          </a:lnRef>
+          <a:fillRef idx="1">
+            <a:schemeClr val="accent1"/>
+          </a:fillRef>
+          <a:effectRef idx="0">
+            <a:schemeClr val="accent1"/>
+          </a:effectRef>
+          <a:fontRef idx="minor">
+            <a:schemeClr val="lt1"/>
+          </a:fontRef>
+        </p:style>
+        <p:txBody>
+          <a:bodyPr rtlCol="0" anchor="t"/>
+          <a:lstStyle/>
+          <a:p>
+            <a:r>
+              <a:rPr lang="en-US" sz="1200" dirty="0" err="1">
+                <a:solidFill>
+                  <a:schemeClr val="tx1"/>
+                </a:solidFill>
+              </a:rPr>
+              <a:t>State_Machine</a:t>
+            </a:r>
+            <a:endParaRPr lang="en-US" sz="1200" dirty="0">
+              <a:solidFill>
+                <a:schemeClr val="tx1"/>
+              </a:solidFill>
+            </a:endParaRPr>
+          </a:p>
+        </p:txBody>
+      </p:sp>
+      <p:sp>
+        <p:nvSpPr>
+          <p:cNvPr id="123" name="Rectangle 122">
+            <a:extLst>
+              <a:ext uri="{FF2B5EF4-FFF2-40B4-BE49-F238E27FC236}">
+                <a16:creationId xmlns:a16="http://schemas.microsoft.com/office/drawing/2014/main" id="{4C4C198D-A016-25B0-6DE7-8495E1E1623C}"/>
+              </a:ext>
+            </a:extLst>
+          </p:cNvPr>
+          <p:cNvSpPr/>
+          <p:nvPr/>
+        </p:nvSpPr>
+        <p:spPr>
+          <a:xfrm>
+            <a:off x="9258636" y="3983198"/>
+            <a:ext cx="2628001" cy="308697"/>
+          </a:xfrm>
+          <a:prstGeom prst="rect">
+            <a:avLst/>
+          </a:prstGeom>
+          <a:noFill/>
+          <a:ln w="28575"/>
+        </p:spPr>
+        <p:style>
+          <a:lnRef idx="2">
+            <a:schemeClr val="accent1">
+              <a:shade val="15000"/>
+            </a:schemeClr>
+          </a:lnRef>
+          <a:fillRef idx="1">
+            <a:schemeClr val="accent1"/>
+          </a:fillRef>
+          <a:effectRef idx="0">
+            <a:schemeClr val="accent1"/>
+          </a:effectRef>
+          <a:fontRef idx="minor">
+            <a:schemeClr val="lt1"/>
+          </a:fontRef>
+        </p:style>
+        <p:txBody>
+          <a:bodyPr rtlCol="0" anchor="t"/>
+          <a:lstStyle/>
+          <a:p>
+            <a:r>
+              <a:rPr lang="en-US" sz="1050" dirty="0" err="1">
+                <a:solidFill>
+                  <a:schemeClr val="tx1"/>
+                </a:solidFill>
+              </a:rPr>
+              <a:t>Player_Flymode_Walk_State</a:t>
+            </a:r>
+            <a:endParaRPr lang="en-US" sz="1050" dirty="0">
+              <a:solidFill>
+                <a:schemeClr val="tx1"/>
+              </a:solidFill>
+            </a:endParaRPr>
+          </a:p>
+        </p:txBody>
+      </p:sp>
+      <p:sp>
+        <p:nvSpPr>
+          <p:cNvPr id="124" name="Rectangle 123">
+            <a:extLst>
+              <a:ext uri="{FF2B5EF4-FFF2-40B4-BE49-F238E27FC236}">
+                <a16:creationId xmlns:a16="http://schemas.microsoft.com/office/drawing/2014/main" id="{39489D08-B2F5-028E-B172-CEEFE6632275}"/>
+              </a:ext>
+            </a:extLst>
+          </p:cNvPr>
+          <p:cNvSpPr/>
+          <p:nvPr/>
+        </p:nvSpPr>
+        <p:spPr>
+          <a:xfrm>
+            <a:off x="9258636" y="4375931"/>
+            <a:ext cx="2628001" cy="288792"/>
+          </a:xfrm>
+          <a:prstGeom prst="rect">
+            <a:avLst/>
+          </a:prstGeom>
+          <a:noFill/>
+          <a:ln w="28575"/>
+        </p:spPr>
+        <p:style>
+          <a:lnRef idx="2">
+            <a:schemeClr val="accent1">
+              <a:shade val="15000"/>
+            </a:schemeClr>
+          </a:lnRef>
+          <a:fillRef idx="1">
+            <a:schemeClr val="accent1"/>
+          </a:fillRef>
+          <a:effectRef idx="0">
+            <a:schemeClr val="accent1"/>
+          </a:effectRef>
+          <a:fontRef idx="minor">
+            <a:schemeClr val="lt1"/>
+          </a:fontRef>
+        </p:style>
+        <p:txBody>
+          <a:bodyPr rtlCol="0" anchor="t"/>
+          <a:lstStyle/>
+          <a:p>
+            <a:r>
+              <a:rPr lang="en-US" sz="1050" dirty="0" err="1">
+                <a:solidFill>
+                  <a:schemeClr val="tx1"/>
+                </a:solidFill>
+              </a:rPr>
+              <a:t>Player_Flymode_Idle_State</a:t>
+            </a:r>
+            <a:endParaRPr lang="en-US" sz="1050" dirty="0">
+              <a:solidFill>
+                <a:schemeClr val="tx1"/>
+              </a:solidFill>
+            </a:endParaRPr>
+          </a:p>
+        </p:txBody>
+      </p:sp>
+      <p:sp>
+        <p:nvSpPr>
+          <p:cNvPr id="125" name="Rectangle 124">
+            <a:extLst>
+              <a:ext uri="{FF2B5EF4-FFF2-40B4-BE49-F238E27FC236}">
+                <a16:creationId xmlns:a16="http://schemas.microsoft.com/office/drawing/2014/main" id="{2C19B5B5-94CE-F45D-AF06-8C3AE945557B}"/>
+              </a:ext>
+            </a:extLst>
+          </p:cNvPr>
+          <p:cNvSpPr/>
+          <p:nvPr/>
+        </p:nvSpPr>
+        <p:spPr>
+          <a:xfrm>
+            <a:off x="9258636" y="4748759"/>
+            <a:ext cx="2628001" cy="288792"/>
+          </a:xfrm>
+          <a:prstGeom prst="rect">
+            <a:avLst/>
+          </a:prstGeom>
+          <a:noFill/>
+          <a:ln w="28575"/>
+        </p:spPr>
+        <p:style>
+          <a:lnRef idx="2">
+            <a:schemeClr val="accent1">
+              <a:shade val="15000"/>
+            </a:schemeClr>
+          </a:lnRef>
+          <a:fillRef idx="1">
+            <a:schemeClr val="accent1"/>
+          </a:fillRef>
+          <a:effectRef idx="0">
+            <a:schemeClr val="accent1"/>
+          </a:effectRef>
+          <a:fontRef idx="minor">
+            <a:schemeClr val="lt1"/>
+          </a:fontRef>
+        </p:style>
+        <p:txBody>
+          <a:bodyPr rtlCol="0" anchor="t"/>
+          <a:lstStyle/>
+          <a:p>
+            <a:r>
+              <a:rPr lang="en-US" sz="1050" dirty="0" err="1">
+                <a:solidFill>
+                  <a:schemeClr val="tx1"/>
+                </a:solidFill>
+              </a:rPr>
+              <a:t>Player_Flymode_Air_State</a:t>
+            </a:r>
+            <a:endParaRPr lang="en-US" sz="1050" dirty="0">
+              <a:solidFill>
+                <a:schemeClr val="tx1"/>
+              </a:solidFill>
+            </a:endParaRPr>
+          </a:p>
+        </p:txBody>
+      </p:sp>
+      <p:sp>
+        <p:nvSpPr>
+          <p:cNvPr id="140" name="TextBox 139">
+            <a:extLst>
+              <a:ext uri="{FF2B5EF4-FFF2-40B4-BE49-F238E27FC236}">
+                <a16:creationId xmlns:a16="http://schemas.microsoft.com/office/drawing/2014/main" id="{64D9E294-5C19-D8A1-D628-13710C915BF8}"/>
+              </a:ext>
+            </a:extLst>
+          </p:cNvPr>
+          <p:cNvSpPr txBox="1"/>
+          <p:nvPr/>
+        </p:nvSpPr>
+        <p:spPr>
+          <a:xfrm>
+            <a:off x="9026204" y="3118586"/>
+            <a:ext cx="2686954" cy="246221"/>
+          </a:xfrm>
+          <a:prstGeom prst="rect">
+            <a:avLst/>
+          </a:prstGeom>
+          <a:noFill/>
+        </p:spPr>
+        <p:txBody>
+          <a:bodyPr wrap="none" rtlCol="0">
+            <a:spAutoFit/>
+          </a:bodyPr>
+          <a:lstStyle/>
+          <a:p>
+            <a:r>
+              <a:rPr lang="en-US" sz="1000" i="1" dirty="0"/>
+              <a:t>Fly mode: Debug mode, activated by keypress</a:t>
+            </a:r>
+          </a:p>
+        </p:txBody>
+      </p:sp>
+      <p:sp>
+        <p:nvSpPr>
+          <p:cNvPr id="141" name="TextBox 140">
+            <a:extLst>
+              <a:ext uri="{FF2B5EF4-FFF2-40B4-BE49-F238E27FC236}">
+                <a16:creationId xmlns:a16="http://schemas.microsoft.com/office/drawing/2014/main" id="{1119F8DD-AA44-6E4D-F500-5E1C26A4C3AC}"/>
+              </a:ext>
+            </a:extLst>
+          </p:cNvPr>
+          <p:cNvSpPr txBox="1"/>
+          <p:nvPr/>
+        </p:nvSpPr>
+        <p:spPr>
+          <a:xfrm>
+            <a:off x="8923534" y="499412"/>
+            <a:ext cx="2459328" cy="246221"/>
+          </a:xfrm>
+          <a:prstGeom prst="rect">
+            <a:avLst/>
+          </a:prstGeom>
+          <a:noFill/>
+        </p:spPr>
+        <p:txBody>
+          <a:bodyPr wrap="none" rtlCol="0">
+            <a:spAutoFit/>
+          </a:bodyPr>
+          <a:lstStyle/>
+          <a:p>
+            <a:r>
+              <a:rPr lang="en-US" sz="1000" i="1" dirty="0"/>
+              <a:t>Tether mode: Activated by Tether weapon</a:t>
+            </a:r>
           </a:p>
         </p:txBody>
       </p:sp>

</xml_diff>